<commit_message>
Working on IRB requirements!
</commit_message>
<xml_diff>
--- a/docs/IRB/benoit_researchPoster.pptx
+++ b/docs/IRB/benoit_researchPoster.pptx
@@ -104,6 +104,22 @@
       </a:defRPr>
     </a:lvl9pPr>
   </p:defaultTextStyle>
+  <p:extLst>
+    <p:ext uri="{EFAFB233-063F-42B5-8137-9DF3F51BA10A}">
+      <p15:sldGuideLst xmlns:p15="http://schemas.microsoft.com/office/powerpoint/2012/main">
+        <p15:guide id="1" orient="horz" pos="2880">
+          <p15:clr>
+            <a:srgbClr val="A4A3A4"/>
+          </p15:clr>
+        </p15:guide>
+        <p15:guide id="2" pos="2160">
+          <p15:clr>
+            <a:srgbClr val="A4A3A4"/>
+          </p15:clr>
+        </p15:guide>
+      </p15:sldGuideLst>
+    </p:ext>
+  </p:extLst>
 </p:presentation>
 </file>
 
@@ -246,7 +262,7 @@
           <a:p>
             <a:fld id="{1D8BD707-D9CF-40AE-B4C6-C98DA3205C09}" type="datetimeFigureOut">
               <a:rPr lang="en-US"/>
-              <a:t>3/3/2015</a:t>
+              <a:t>3/31/2015</a:t>
             </a:fld>
             <a:endParaRPr lang="en-US"/>
           </a:p>
@@ -411,7 +427,7 @@
           <a:p>
             <a:fld id="{1D8BD707-D9CF-40AE-B4C6-C98DA3205C09}" type="datetimeFigureOut">
               <a:rPr lang="en-US"/>
-              <a:t>3/3/2015</a:t>
+              <a:t>3/31/2015</a:t>
             </a:fld>
             <a:endParaRPr lang="en-US"/>
           </a:p>
@@ -619,7 +635,7 @@
           <a:p>
             <a:fld id="{1D8BD707-D9CF-40AE-B4C6-C98DA3205C09}" type="datetimeFigureOut">
               <a:rPr lang="en-US"/>
-              <a:t>3/3/2015</a:t>
+              <a:t>3/31/2015</a:t>
             </a:fld>
             <a:endParaRPr lang="en-US"/>
           </a:p>
@@ -761,7 +777,7 @@
           <a:p>
             <a:fld id="{1D8BD707-D9CF-40AE-B4C6-C98DA3205C09}" type="datetimeFigureOut">
               <a:rPr lang="en-US"/>
-              <a:t>3/3/2015</a:t>
+              <a:t>3/31/2015</a:t>
             </a:fld>
             <a:endParaRPr lang="en-US"/>
           </a:p>
@@ -880,7 +896,7 @@
           <a:p>
             <a:fld id="{1D8BD707-D9CF-40AE-B4C6-C98DA3205C09}" type="datetimeFigureOut">
               <a:rPr lang="en-US"/>
-              <a:t>3/3/2015</a:t>
+              <a:t>3/31/2015</a:t>
             </a:fld>
             <a:endParaRPr lang="en-US"/>
           </a:p>
@@ -1300,7 +1316,7 @@
           <a:p>
             <a:fld id="{1D8BD707-D9CF-40AE-B4C6-C98DA3205C09}" type="datetimeFigureOut">
               <a:rPr lang="en-US"/>
-              <a:t>3/3/2015</a:t>
+              <a:t>3/31/2015</a:t>
             </a:fld>
             <a:endParaRPr lang="en-US"/>
           </a:p>
@@ -4457,14 +4473,114 @@
               <a:t> </a:t>
             </a:r>
             <a:r>
-              <a:rPr sz="1500" spc="-35" dirty="0">
-                <a:solidFill>
-                  <a:schemeClr val="bg1"/>
-                </a:solidFill>
-                <a:latin typeface="Arial"/>
-                <a:cs typeface="Arial"/>
-              </a:rPr>
-              <a:t>45-60</a:t>
+              <a:rPr lang="en-US" sz="1500" spc="-35" dirty="0" smtClean="0">
+                <a:solidFill>
+                  <a:schemeClr val="bg1"/>
+                </a:solidFill>
+                <a:latin typeface="Arial"/>
+                <a:cs typeface="Arial"/>
+              </a:rPr>
+              <a:t>30</a:t>
+            </a:r>
+            <a:r>
+              <a:rPr sz="1500" spc="-35" dirty="0" smtClean="0">
+                <a:solidFill>
+                  <a:schemeClr val="bg1"/>
+                </a:solidFill>
+                <a:latin typeface="Arial"/>
+                <a:cs typeface="Arial"/>
+              </a:rPr>
+              <a:t>-60</a:t>
+            </a:r>
+            <a:r>
+              <a:rPr sz="1500" spc="-20" dirty="0" smtClean="0">
+                <a:solidFill>
+                  <a:schemeClr val="bg1"/>
+                </a:solidFill>
+                <a:latin typeface="Arial"/>
+                <a:cs typeface="Arial"/>
+              </a:rPr>
+              <a:t> </a:t>
+            </a:r>
+            <a:r>
+              <a:rPr sz="1500" spc="-55" dirty="0">
+                <a:solidFill>
+                  <a:schemeClr val="bg1"/>
+                </a:solidFill>
+                <a:latin typeface="Arial"/>
+                <a:cs typeface="Arial"/>
+              </a:rPr>
+              <a:t>minute</a:t>
+            </a:r>
+            <a:r>
+              <a:rPr sz="1500" spc="5" dirty="0">
+                <a:solidFill>
+                  <a:schemeClr val="bg1"/>
+                </a:solidFill>
+                <a:latin typeface="Arial"/>
+                <a:cs typeface="Arial"/>
+              </a:rPr>
+              <a:t> </a:t>
+            </a:r>
+            <a:r>
+              <a:rPr sz="1500" spc="-105" dirty="0">
+                <a:solidFill>
+                  <a:schemeClr val="bg1"/>
+                </a:solidFill>
+                <a:latin typeface="Arial"/>
+                <a:cs typeface="Arial"/>
+              </a:rPr>
+              <a:t>session</a:t>
+            </a:r>
+            <a:r>
+              <a:rPr sz="1500" spc="50" dirty="0">
+                <a:solidFill>
+                  <a:schemeClr val="bg1"/>
+                </a:solidFill>
+                <a:latin typeface="Arial"/>
+                <a:cs typeface="Arial"/>
+              </a:rPr>
+              <a:t> </a:t>
+            </a:r>
+            <a:r>
+              <a:rPr sz="1500" spc="-50" dirty="0">
+                <a:solidFill>
+                  <a:schemeClr val="bg1"/>
+                </a:solidFill>
+                <a:latin typeface="Arial"/>
+                <a:cs typeface="Arial"/>
+              </a:rPr>
+              <a:t>and</a:t>
+            </a:r>
+            <a:r>
+              <a:rPr sz="1500" spc="-45" dirty="0">
+                <a:solidFill>
+                  <a:schemeClr val="bg1"/>
+                </a:solidFill>
+                <a:latin typeface="Arial"/>
+                <a:cs typeface="Arial"/>
+              </a:rPr>
+              <a:t> </a:t>
+            </a:r>
+            <a:r>
+              <a:rPr sz="1500" spc="-65" dirty="0">
+                <a:solidFill>
+                  <a:schemeClr val="bg1"/>
+                </a:solidFill>
+                <a:latin typeface="Arial"/>
+                <a:cs typeface="Arial"/>
+              </a:rPr>
+              <a:t>can</a:t>
+            </a:r>
+            <a:r>
+              <a:rPr sz="1500" spc="-10" dirty="0">
+                <a:solidFill>
+                  <a:schemeClr val="bg1"/>
+                </a:solidFill>
+                <a:latin typeface="Arial"/>
+                <a:cs typeface="Arial"/>
+              </a:rPr>
+              <a:t> </a:t>
             </a:r>
             <a:r>
               <a:rPr sz="1500" spc="-20" dirty="0">
@@ -4474,40 +4590,40 @@
                 <a:latin typeface="Arial"/>
                 <a:cs typeface="Arial"/>
               </a:rPr>
-              <a:t> </a:t>
-            </a:r>
-            <a:r>
-              <a:rPr sz="1500" spc="-55" dirty="0">
-                <a:solidFill>
-                  <a:schemeClr val="bg1"/>
-                </a:solidFill>
-                <a:latin typeface="Arial"/>
-                <a:cs typeface="Arial"/>
-              </a:rPr>
-              <a:t>minute</a:t>
-            </a:r>
-            <a:r>
-              <a:rPr sz="1500" spc="5" dirty="0">
-                <a:solidFill>
-                  <a:schemeClr val="bg1"/>
-                </a:solidFill>
-                <a:latin typeface="Arial"/>
-                <a:cs typeface="Arial"/>
-              </a:rPr>
-              <a:t> </a:t>
-            </a:r>
-            <a:r>
-              <a:rPr sz="1500" spc="-105" dirty="0">
-                <a:solidFill>
-                  <a:schemeClr val="bg1"/>
-                </a:solidFill>
-                <a:latin typeface="Arial"/>
-                <a:cs typeface="Arial"/>
-              </a:rPr>
-              <a:t>session</a:t>
-            </a:r>
-            <a:r>
-              <a:rPr sz="1500" spc="50" dirty="0">
+              <a:t>be</a:t>
+            </a:r>
+            <a:r>
+              <a:rPr sz="1500" spc="-80" dirty="0">
+                <a:solidFill>
+                  <a:schemeClr val="bg1"/>
+                </a:solidFill>
+                <a:latin typeface="Arial"/>
+                <a:cs typeface="Arial"/>
+              </a:rPr>
+              <a:t> scheduled</a:t>
+            </a:r>
+            <a:r>
+              <a:rPr sz="1500" spc="-45" dirty="0">
+                <a:solidFill>
+                  <a:schemeClr val="bg1"/>
+                </a:solidFill>
+                <a:latin typeface="Arial"/>
+                <a:cs typeface="Arial"/>
+              </a:rPr>
+              <a:t> </a:t>
+            </a:r>
+            <a:r>
+              <a:rPr sz="1500" spc="-65" dirty="0">
+                <a:solidFill>
+                  <a:schemeClr val="bg1"/>
+                </a:solidFill>
+                <a:latin typeface="Arial"/>
+                <a:cs typeface="Arial"/>
+              </a:rPr>
+              <a:t>any</a:t>
+            </a:r>
+            <a:r>
+              <a:rPr sz="1500" spc="-60" dirty="0">
                 <a:solidFill>
                   <a:schemeClr val="bg1"/>
                 </a:solidFill>
@@ -4524,10 +4640,10 @@
                 <a:latin typeface="Arial"/>
                 <a:cs typeface="Arial"/>
               </a:rPr>
-              <a:t>and</a:t>
-            </a:r>
-            <a:r>
-              <a:rPr sz="1500" spc="-45" dirty="0">
+              <a:t>day</a:t>
+            </a:r>
+            <a:r>
+              <a:rPr sz="1500" spc="35" dirty="0">
                 <a:solidFill>
                   <a:schemeClr val="bg1"/>
                 </a:solidFill>
@@ -4544,96 +4660,6 @@
                 <a:latin typeface="Arial"/>
                 <a:cs typeface="Arial"/>
               </a:rPr>
-              <a:t>can</a:t>
-            </a:r>
-            <a:r>
-              <a:rPr sz="1500" spc="-10" dirty="0">
-                <a:solidFill>
-                  <a:schemeClr val="bg1"/>
-                </a:solidFill>
-                <a:latin typeface="Arial"/>
-                <a:cs typeface="Arial"/>
-              </a:rPr>
-              <a:t> </a:t>
-            </a:r>
-            <a:r>
-              <a:rPr sz="1500" spc="-20" dirty="0">
-                <a:solidFill>
-                  <a:schemeClr val="bg1"/>
-                </a:solidFill>
-                <a:latin typeface="Arial"/>
-                <a:cs typeface="Arial"/>
-              </a:rPr>
-              <a:t>be</a:t>
-            </a:r>
-            <a:r>
-              <a:rPr sz="1500" spc="-80" dirty="0">
-                <a:solidFill>
-                  <a:schemeClr val="bg1"/>
-                </a:solidFill>
-                <a:latin typeface="Arial"/>
-                <a:cs typeface="Arial"/>
-              </a:rPr>
-              <a:t> scheduled</a:t>
-            </a:r>
-            <a:r>
-              <a:rPr sz="1500" spc="-45" dirty="0">
-                <a:solidFill>
-                  <a:schemeClr val="bg1"/>
-                </a:solidFill>
-                <a:latin typeface="Arial"/>
-                <a:cs typeface="Arial"/>
-              </a:rPr>
-              <a:t> </a:t>
-            </a:r>
-            <a:r>
-              <a:rPr sz="1500" spc="-65" dirty="0">
-                <a:solidFill>
-                  <a:schemeClr val="bg1"/>
-                </a:solidFill>
-                <a:latin typeface="Arial"/>
-                <a:cs typeface="Arial"/>
-              </a:rPr>
-              <a:t>any</a:t>
-            </a:r>
-            <a:r>
-              <a:rPr sz="1500" spc="-60" dirty="0">
-                <a:solidFill>
-                  <a:schemeClr val="bg1"/>
-                </a:solidFill>
-                <a:latin typeface="Arial"/>
-                <a:cs typeface="Arial"/>
-              </a:rPr>
-              <a:t> </a:t>
-            </a:r>
-            <a:r>
-              <a:rPr sz="1500" spc="-50" dirty="0">
-                <a:solidFill>
-                  <a:schemeClr val="bg1"/>
-                </a:solidFill>
-                <a:latin typeface="Arial"/>
-                <a:cs typeface="Arial"/>
-              </a:rPr>
-              <a:t>day</a:t>
-            </a:r>
-            <a:r>
-              <a:rPr sz="1500" spc="35" dirty="0">
-                <a:solidFill>
-                  <a:schemeClr val="bg1"/>
-                </a:solidFill>
-                <a:latin typeface="Arial"/>
-                <a:cs typeface="Arial"/>
-              </a:rPr>
-              <a:t> </a:t>
-            </a:r>
-            <a:r>
-              <a:rPr sz="1500" spc="-65" dirty="0">
-                <a:solidFill>
-                  <a:schemeClr val="bg1"/>
-                </a:solidFill>
-                <a:latin typeface="Arial"/>
-                <a:cs typeface="Arial"/>
-              </a:rPr>
               <a:t>between</a:t>
             </a:r>
             <a:r>
@@ -4654,30 +4680,20 @@
                 <a:latin typeface="Arial"/>
                 <a:cs typeface="Arial"/>
               </a:rPr>
-              <a:t>&lt;approval </a:t>
-            </a:r>
-            <a:r>
-              <a:rPr lang="en-US" sz="1500" spc="-70" smtClean="0">
-                <a:solidFill>
-                  <a:schemeClr val="bg1"/>
-                </a:solidFill>
-                <a:latin typeface="Arial"/>
-                <a:cs typeface="Arial"/>
-              </a:rPr>
-              <a:t>date pending&gt;</a:t>
-            </a:r>
-            <a:r>
-              <a:rPr sz="1500" spc="-70" smtClean="0">
-                <a:solidFill>
-                  <a:schemeClr val="bg1"/>
-                </a:solidFill>
-                <a:latin typeface="Arial"/>
-                <a:cs typeface="Arial"/>
-              </a:rPr>
-              <a:t> </a:t>
-            </a:r>
-            <a:r>
-              <a:rPr sz="1500" spc="30" dirty="0" smtClean="0">
+              <a:t>&lt;upon IRB approval date&gt;</a:t>
+            </a:r>
+            <a:r>
+              <a:rPr sz="1500" spc="-70" dirty="0" smtClean="0">
+                <a:solidFill>
+                  <a:schemeClr val="bg1"/>
+                </a:solidFill>
+                <a:latin typeface="Arial"/>
+                <a:cs typeface="Arial"/>
+              </a:rPr>
+              <a:t> </a:t>
+            </a:r>
+            <a:r>
+              <a:rPr sz="1500" spc="30" smtClean="0">
                 <a:solidFill>
                   <a:schemeClr val="bg1"/>
                 </a:solidFill>
@@ -4687,47 +4703,37 @@
               <a:t>to</a:t>
             </a:r>
             <a:r>
-              <a:rPr lang="en-US" sz="1500" spc="30" dirty="0" smtClean="0">
-                <a:solidFill>
-                  <a:schemeClr val="bg1"/>
-                </a:solidFill>
-                <a:latin typeface="Arial"/>
-                <a:cs typeface="Arial"/>
-              </a:rPr>
-              <a:t> </a:t>
-            </a:r>
-            <a:r>
-              <a:rPr lang="en-US" sz="1500" spc="30" dirty="0" smtClean="0">
-                <a:solidFill>
-                  <a:schemeClr val="bg1"/>
-                </a:solidFill>
-                <a:latin typeface="Arial"/>
-                <a:cs typeface="Arial"/>
-              </a:rPr>
-              <a:t>April</a:t>
-            </a:r>
-            <a:r>
-              <a:rPr sz="1500" spc="-5" dirty="0" smtClean="0">
-                <a:solidFill>
-                  <a:schemeClr val="bg1"/>
-                </a:solidFill>
-                <a:latin typeface="Arial"/>
-                <a:cs typeface="Arial"/>
-              </a:rPr>
-              <a:t> </a:t>
-            </a:r>
-            <a:r>
-              <a:rPr sz="1500" spc="-45" dirty="0">
-                <a:solidFill>
-                  <a:schemeClr val="bg1"/>
-                </a:solidFill>
-                <a:latin typeface="Arial"/>
-                <a:cs typeface="Arial"/>
-              </a:rPr>
-              <a:t>30th</a:t>
-            </a:r>
-            <a:r>
-              <a:rPr sz="1500" spc="-40" dirty="0">
+              <a:rPr lang="en-US" sz="1500" spc="30" smtClean="0">
+                <a:solidFill>
+                  <a:schemeClr val="bg1"/>
+                </a:solidFill>
+                <a:latin typeface="Arial"/>
+                <a:cs typeface="Arial"/>
+              </a:rPr>
+              <a:t> </a:t>
+            </a:r>
+            <a:r>
+              <a:rPr lang="en-US" sz="1500" spc="30" smtClean="0">
+                <a:solidFill>
+                  <a:schemeClr val="bg1"/>
+                </a:solidFill>
+                <a:latin typeface="Arial"/>
+                <a:cs typeface="Arial"/>
+              </a:rPr>
+              <a:t>April 30</a:t>
+            </a:r>
+            <a:r>
+              <a:rPr sz="1500" spc="-45" smtClean="0">
+                <a:solidFill>
+                  <a:schemeClr val="bg1"/>
+                </a:solidFill>
+                <a:latin typeface="Arial"/>
+                <a:cs typeface="Arial"/>
+              </a:rPr>
+              <a:t>th</a:t>
+            </a:r>
+            <a:r>
+              <a:rPr sz="1500" spc="-40" smtClean="0">
                 <a:solidFill>
                   <a:schemeClr val="bg1"/>
                 </a:solidFill>

</xml_diff>

<commit_message>
Adding some changes to IRB docs.
Need to finish this This weekend ASAP.
</commit_message>
<xml_diff>
--- a/docs/IRB/benoit_researchPoster.pptx
+++ b/docs/IRB/benoit_researchPoster.pptx
@@ -262,7 +262,7 @@
           <a:p>
             <a:fld id="{1D8BD707-D9CF-40AE-B4C6-C98DA3205C09}" type="datetimeFigureOut">
               <a:rPr lang="en-US"/>
-              <a:t>3/31/2015</a:t>
+              <a:t>4/2/2015</a:t>
             </a:fld>
             <a:endParaRPr lang="en-US"/>
           </a:p>
@@ -427,7 +427,7 @@
           <a:p>
             <a:fld id="{1D8BD707-D9CF-40AE-B4C6-C98DA3205C09}" type="datetimeFigureOut">
               <a:rPr lang="en-US"/>
-              <a:t>3/31/2015</a:t>
+              <a:t>4/2/2015</a:t>
             </a:fld>
             <a:endParaRPr lang="en-US"/>
           </a:p>
@@ -635,7 +635,7 @@
           <a:p>
             <a:fld id="{1D8BD707-D9CF-40AE-B4C6-C98DA3205C09}" type="datetimeFigureOut">
               <a:rPr lang="en-US"/>
-              <a:t>3/31/2015</a:t>
+              <a:t>4/2/2015</a:t>
             </a:fld>
             <a:endParaRPr lang="en-US"/>
           </a:p>
@@ -777,7 +777,7 @@
           <a:p>
             <a:fld id="{1D8BD707-D9CF-40AE-B4C6-C98DA3205C09}" type="datetimeFigureOut">
               <a:rPr lang="en-US"/>
-              <a:t>3/31/2015</a:t>
+              <a:t>4/2/2015</a:t>
             </a:fld>
             <a:endParaRPr lang="en-US"/>
           </a:p>
@@ -896,7 +896,7 @@
           <a:p>
             <a:fld id="{1D8BD707-D9CF-40AE-B4C6-C98DA3205C09}" type="datetimeFigureOut">
               <a:rPr lang="en-US"/>
-              <a:t>3/31/2015</a:t>
+              <a:t>4/2/2015</a:t>
             </a:fld>
             <a:endParaRPr lang="en-US"/>
           </a:p>
@@ -1316,7 +1316,7 @@
           <a:p>
             <a:fld id="{1D8BD707-D9CF-40AE-B4C6-C98DA3205C09}" type="datetimeFigureOut">
               <a:rPr lang="en-US"/>
-              <a:t>3/31/2015</a:t>
+              <a:t>4/2/2015</a:t>
             </a:fld>
             <a:endParaRPr lang="en-US"/>
           </a:p>
@@ -1786,114 +1786,14 @@
               </a:lnSpc>
             </a:pPr>
             <a:r>
-              <a:rPr sz="2500" spc="-75" dirty="0">
-                <a:solidFill>
-                  <a:schemeClr val="bg1"/>
-                </a:solidFill>
-                <a:latin typeface="Arial"/>
-                <a:cs typeface="Arial"/>
-              </a:rPr>
-              <a:t>Next-generation</a:t>
-            </a:r>
-            <a:r>
-              <a:rPr sz="2500" spc="320" dirty="0">
-                <a:solidFill>
-                  <a:schemeClr val="bg1"/>
-                </a:solidFill>
-                <a:latin typeface="Arial"/>
-                <a:cs typeface="Arial"/>
-              </a:rPr>
-              <a:t> </a:t>
-            </a:r>
-            <a:r>
-              <a:rPr sz="2500" spc="-70" dirty="0">
-                <a:solidFill>
-                  <a:schemeClr val="bg1"/>
-                </a:solidFill>
-                <a:latin typeface="Arial"/>
-                <a:cs typeface="Arial"/>
-              </a:rPr>
-              <a:t>Computer</a:t>
-            </a:r>
-            <a:r>
-              <a:rPr sz="2500" spc="190" dirty="0">
-                <a:solidFill>
-                  <a:schemeClr val="bg1"/>
-                </a:solidFill>
-                <a:latin typeface="Arial"/>
-                <a:cs typeface="Arial"/>
-              </a:rPr>
-              <a:t> </a:t>
-            </a:r>
-            <a:r>
-              <a:rPr sz="2500" spc="-55" dirty="0">
-                <a:solidFill>
-                  <a:schemeClr val="bg1"/>
-                </a:solidFill>
-                <a:latin typeface="Arial"/>
-                <a:cs typeface="Arial"/>
-              </a:rPr>
-              <a:t>Interface</a:t>
-            </a:r>
-            <a:r>
-              <a:rPr sz="2500" spc="125" dirty="0">
-                <a:solidFill>
-                  <a:schemeClr val="bg1"/>
-                </a:solidFill>
-                <a:latin typeface="Arial"/>
-                <a:cs typeface="Arial"/>
-              </a:rPr>
-              <a:t> </a:t>
-            </a:r>
-            <a:r>
-              <a:rPr sz="2500" spc="-110" dirty="0">
-                <a:solidFill>
-                  <a:schemeClr val="bg1"/>
-                </a:solidFill>
-                <a:latin typeface="Arial"/>
-                <a:cs typeface="Arial"/>
-              </a:rPr>
-              <a:t>Design:</a:t>
-            </a:r>
-            <a:r>
-              <a:rPr sz="2500" spc="-65" dirty="0">
-                <a:solidFill>
-                  <a:schemeClr val="bg1"/>
-                </a:solidFill>
-                <a:latin typeface="Arial"/>
-                <a:cs typeface="Arial"/>
-              </a:rPr>
-              <a:t> </a:t>
-            </a:r>
-            <a:r>
-              <a:rPr sz="2500" spc="-120" dirty="0">
-                <a:solidFill>
-                  <a:schemeClr val="bg1"/>
-                </a:solidFill>
-                <a:latin typeface="Arial"/>
-                <a:cs typeface="Arial"/>
-              </a:rPr>
-              <a:t>Gestural</a:t>
-            </a:r>
-            <a:r>
-              <a:rPr sz="2500" spc="65" dirty="0">
-                <a:solidFill>
-                  <a:schemeClr val="bg1"/>
-                </a:solidFill>
-                <a:latin typeface="Arial"/>
-                <a:cs typeface="Arial"/>
-              </a:rPr>
-              <a:t> </a:t>
-            </a:r>
-            <a:r>
-              <a:rPr sz="2500" spc="-45" dirty="0">
-                <a:solidFill>
-                  <a:schemeClr val="bg1"/>
-                </a:solidFill>
-                <a:latin typeface="Arial"/>
-                <a:cs typeface="Arial"/>
-              </a:rPr>
-              <a:t>Interaction</a:t>
+              <a:rPr lang="en-US" sz="2500" spc="-75" dirty="0">
+                <a:solidFill>
+                  <a:schemeClr val="bg1"/>
+                </a:solidFill>
+                <a:latin typeface="Arial"/>
+                <a:cs typeface="Arial"/>
+              </a:rPr>
+              <a:t>Using the Leap Motion to extend Mid-Air Word-Gesture Keyboards</a:t>
             </a:r>
             <a:endParaRPr sz="2500" dirty="0">
               <a:solidFill>
@@ -4710,17 +4610,7 @@
                 <a:latin typeface="Arial"/>
                 <a:cs typeface="Arial"/>
               </a:rPr>
-              <a:t> </a:t>
-            </a:r>
-            <a:r>
-              <a:rPr lang="en-US" sz="1500" spc="30" smtClean="0">
-                <a:solidFill>
-                  <a:schemeClr val="bg1"/>
-                </a:solidFill>
-                <a:latin typeface="Arial"/>
-                <a:cs typeface="Arial"/>
-              </a:rPr>
-              <a:t>April 30</a:t>
+              <a:t> April 30</a:t>
             </a:r>
             <a:r>
               <a:rPr sz="1500" spc="-45" smtClean="0">

</xml_diff>